<commit_message>
updated CQRS & EventSourcing
</commit_message>
<xml_diff>
--- a/CQRS & EventSourcing for mobile Apps.pptx
+++ b/CQRS & EventSourcing for mobile Apps.pptx
@@ -6377,7 +6377,7 @@
       </p:sp>
       <p:pic>
         <p:nvPicPr>
-          <p:cNvPr id="6" name="Content Placeholder 5"/>
+          <p:cNvPr id="8" name="Content Placeholder 7"/>
           <p:cNvPicPr>
             <a:picLocks noGrp="1" noChangeAspect="1"/>
           </p:cNvPicPr>
@@ -6399,8 +6399,8 @@
         </p:blipFill>
         <p:spPr>
           <a:xfrm>
-            <a:off x="1913815" y="474296"/>
-            <a:ext cx="6379953" cy="5121270"/>
+            <a:off x="1962969" y="432392"/>
+            <a:ext cx="6635599" cy="5310087"/>
           </a:xfrm>
         </p:spPr>
       </p:pic>

</xml_diff>